<commit_message>
ajout du graph dans le pp
</commit_message>
<xml_diff>
--- a/Présentation.pptx
+++ b/Présentation.pptx
@@ -10,6 +10,7 @@
     <p:sldId id="258" r:id="rId4"/>
     <p:sldId id="259" r:id="rId5"/>
     <p:sldId id="260" r:id="rId6"/>
+    <p:sldId id="261" r:id="rId7"/>
   </p:sldIdLst>
   <p:sldSz cx="12192000" cy="6858000"/>
   <p:notesSz cx="6858000" cy="9144000"/>
@@ -108,6 +109,11 @@
       </a:defRPr>
     </a:lvl9pPr>
   </p:defaultTextStyle>
+  <p:extLst>
+    <p:ext uri="{EFAFB233-063F-42B5-8137-9DF3F51BA10A}">
+      <p15:sldGuideLst xmlns:p15="http://schemas.microsoft.com/office/powerpoint/2012/main"/>
+    </p:ext>
+  </p:extLst>
 </p:presentation>
 </file>
 
@@ -258,7 +264,7 @@
           <a:p>
             <a:fld id="{6059FE6A-2FE6-4909-8879-B2C5789DC49E}" type="datetimeFigureOut">
               <a:rPr lang="fr-FR" smtClean="0"/>
-              <a:t>21/11/2024</a:t>
+              <a:t>22/11/2024</a:t>
             </a:fld>
             <a:endParaRPr lang="fr-FR"/>
           </a:p>
@@ -456,7 +462,7 @@
           <a:p>
             <a:fld id="{6059FE6A-2FE6-4909-8879-B2C5789DC49E}" type="datetimeFigureOut">
               <a:rPr lang="fr-FR" smtClean="0"/>
-              <a:t>21/11/2024</a:t>
+              <a:t>22/11/2024</a:t>
             </a:fld>
             <a:endParaRPr lang="fr-FR"/>
           </a:p>
@@ -664,7 +670,7 @@
           <a:p>
             <a:fld id="{6059FE6A-2FE6-4909-8879-B2C5789DC49E}" type="datetimeFigureOut">
               <a:rPr lang="fr-FR" smtClean="0"/>
-              <a:t>21/11/2024</a:t>
+              <a:t>22/11/2024</a:t>
             </a:fld>
             <a:endParaRPr lang="fr-FR"/>
           </a:p>
@@ -862,7 +868,7 @@
           <a:p>
             <a:fld id="{6059FE6A-2FE6-4909-8879-B2C5789DC49E}" type="datetimeFigureOut">
               <a:rPr lang="fr-FR" smtClean="0"/>
-              <a:t>21/11/2024</a:t>
+              <a:t>22/11/2024</a:t>
             </a:fld>
             <a:endParaRPr lang="fr-FR"/>
           </a:p>
@@ -1137,7 +1143,7 @@
           <a:p>
             <a:fld id="{6059FE6A-2FE6-4909-8879-B2C5789DC49E}" type="datetimeFigureOut">
               <a:rPr lang="fr-FR" smtClean="0"/>
-              <a:t>21/11/2024</a:t>
+              <a:t>22/11/2024</a:t>
             </a:fld>
             <a:endParaRPr lang="fr-FR"/>
           </a:p>
@@ -1402,7 +1408,7 @@
           <a:p>
             <a:fld id="{6059FE6A-2FE6-4909-8879-B2C5789DC49E}" type="datetimeFigureOut">
               <a:rPr lang="fr-FR" smtClean="0"/>
-              <a:t>21/11/2024</a:t>
+              <a:t>22/11/2024</a:t>
             </a:fld>
             <a:endParaRPr lang="fr-FR"/>
           </a:p>
@@ -1814,7 +1820,7 @@
           <a:p>
             <a:fld id="{6059FE6A-2FE6-4909-8879-B2C5789DC49E}" type="datetimeFigureOut">
               <a:rPr lang="fr-FR" smtClean="0"/>
-              <a:t>21/11/2024</a:t>
+              <a:t>22/11/2024</a:t>
             </a:fld>
             <a:endParaRPr lang="fr-FR"/>
           </a:p>
@@ -1955,7 +1961,7 @@
           <a:p>
             <a:fld id="{6059FE6A-2FE6-4909-8879-B2C5789DC49E}" type="datetimeFigureOut">
               <a:rPr lang="fr-FR" smtClean="0"/>
-              <a:t>21/11/2024</a:t>
+              <a:t>22/11/2024</a:t>
             </a:fld>
             <a:endParaRPr lang="fr-FR"/>
           </a:p>
@@ -2068,7 +2074,7 @@
           <a:p>
             <a:fld id="{6059FE6A-2FE6-4909-8879-B2C5789DC49E}" type="datetimeFigureOut">
               <a:rPr lang="fr-FR" smtClean="0"/>
-              <a:t>21/11/2024</a:t>
+              <a:t>22/11/2024</a:t>
             </a:fld>
             <a:endParaRPr lang="fr-FR"/>
           </a:p>
@@ -2379,7 +2385,7 @@
           <a:p>
             <a:fld id="{6059FE6A-2FE6-4909-8879-B2C5789DC49E}" type="datetimeFigureOut">
               <a:rPr lang="fr-FR" smtClean="0"/>
-              <a:t>21/11/2024</a:t>
+              <a:t>22/11/2024</a:t>
             </a:fld>
             <a:endParaRPr lang="fr-FR"/>
           </a:p>
@@ -2667,7 +2673,7 @@
           <a:p>
             <a:fld id="{6059FE6A-2FE6-4909-8879-B2C5789DC49E}" type="datetimeFigureOut">
               <a:rPr lang="fr-FR" smtClean="0"/>
-              <a:t>21/11/2024</a:t>
+              <a:t>22/11/2024</a:t>
             </a:fld>
             <a:endParaRPr lang="fr-FR"/>
           </a:p>
@@ -2908,7 +2914,7 @@
           <a:p>
             <a:fld id="{6059FE6A-2FE6-4909-8879-B2C5789DC49E}" type="datetimeFigureOut">
               <a:rPr lang="fr-FR" smtClean="0"/>
-              <a:t>21/11/2024</a:t>
+              <a:t>22/11/2024</a:t>
             </a:fld>
             <a:endParaRPr lang="fr-FR"/>
           </a:p>
@@ -3657,6 +3663,76 @@
     <p:extLst>
       <p:ext uri="{BB962C8B-B14F-4D97-AF65-F5344CB8AC3E}">
         <p14:creationId xmlns:p14="http://schemas.microsoft.com/office/powerpoint/2010/main" val="2031193738"/>
+      </p:ext>
+    </p:extLst>
+  </p:cSld>
+  <p:clrMapOvr>
+    <a:masterClrMapping/>
+  </p:clrMapOvr>
+</p:sld>
+</file>
+
+<file path=ppt/slides/slide6.xml><?xml version="1.0" encoding="utf-8"?>
+<p:sld xmlns:a="http://schemas.openxmlformats.org/drawingml/2006/main" xmlns:r="http://schemas.openxmlformats.org/officeDocument/2006/relationships" xmlns:p="http://schemas.openxmlformats.org/presentationml/2006/main">
+  <p:cSld>
+    <p:bg>
+      <p:bgPr>
+        <a:solidFill>
+          <a:schemeClr val="bg1"/>
+        </a:solidFill>
+        <a:effectLst/>
+      </p:bgPr>
+    </p:bg>
+    <p:spTree>
+      <p:nvGrpSpPr>
+        <p:cNvPr id="1" name=""/>
+        <p:cNvGrpSpPr/>
+        <p:nvPr/>
+      </p:nvGrpSpPr>
+      <p:grpSpPr>
+        <a:xfrm>
+          <a:off x="0" y="0"/>
+          <a:ext cx="0" cy="0"/>
+          <a:chOff x="0" y="0"/>
+          <a:chExt cx="0" cy="0"/>
+        </a:xfrm>
+      </p:grpSpPr>
+      <p:pic>
+        <p:nvPicPr>
+          <p:cNvPr id="4" name="Espace réservé du contenu 3">
+            <a:extLst>
+              <a:ext uri="{FF2B5EF4-FFF2-40B4-BE49-F238E27FC236}">
+                <a16:creationId xmlns:a16="http://schemas.microsoft.com/office/drawing/2014/main" id="{E3AE605F-AB33-EFCE-32B2-A36C6FBB17EC}"/>
+              </a:ext>
+            </a:extLst>
+          </p:cNvPr>
+          <p:cNvPicPr>
+            <a:picLocks noGrp="1" noChangeAspect="1"/>
+          </p:cNvPicPr>
+          <p:nvPr>
+            <p:ph idx="1"/>
+          </p:nvPr>
+        </p:nvPicPr>
+        <p:blipFill>
+          <a:blip r:embed="rId2"/>
+          <a:stretch>
+            <a:fillRect/>
+          </a:stretch>
+        </p:blipFill>
+        <p:spPr>
+          <a:xfrm>
+            <a:off x="2262554" y="438912"/>
+            <a:ext cx="7752862" cy="6047232"/>
+          </a:xfrm>
+          <a:prstGeom prst="rect">
+            <a:avLst/>
+          </a:prstGeom>
+        </p:spPr>
+      </p:pic>
+    </p:spTree>
+    <p:extLst>
+      <p:ext uri="{BB962C8B-B14F-4D97-AF65-F5344CB8AC3E}">
+        <p14:creationId xmlns:p14="http://schemas.microsoft.com/office/powerpoint/2010/main" val="1996213175"/>
       </p:ext>
     </p:extLst>
   </p:cSld>

</xml_diff>

<commit_message>
ajustement du graphique 3 dans le pp et le code
</commit_message>
<xml_diff>
--- a/Présentation.pptx
+++ b/Présentation.pptx
@@ -4,6 +4,9 @@
   <p:sldMasterIdLst>
     <p:sldMasterId id="2147483648" r:id="rId1"/>
   </p:sldMasterIdLst>
+  <p:notesMasterIdLst>
+    <p:notesMasterId r:id="rId8"/>
+  </p:notesMasterIdLst>
   <p:sldIdLst>
     <p:sldId id="256" r:id="rId2"/>
     <p:sldId id="257" r:id="rId3"/>
@@ -115,6 +118,439 @@
     </p:ext>
   </p:extLst>
 </p:presentation>
+</file>
+
+<file path=ppt/notesMasters/notesMaster1.xml><?xml version="1.0" encoding="utf-8"?>
+<p:notesMaster xmlns:a="http://schemas.openxmlformats.org/drawingml/2006/main" xmlns:r="http://schemas.openxmlformats.org/officeDocument/2006/relationships" xmlns:p="http://schemas.openxmlformats.org/presentationml/2006/main">
+  <p:cSld>
+    <p:bg>
+      <p:bgRef idx="1001">
+        <a:schemeClr val="bg1"/>
+      </p:bgRef>
+    </p:bg>
+    <p:spTree>
+      <p:nvGrpSpPr>
+        <p:cNvPr id="1" name=""/>
+        <p:cNvGrpSpPr/>
+        <p:nvPr/>
+      </p:nvGrpSpPr>
+      <p:grpSpPr>
+        <a:xfrm>
+          <a:off x="0" y="0"/>
+          <a:ext cx="0" cy="0"/>
+          <a:chOff x="0" y="0"/>
+          <a:chExt cx="0" cy="0"/>
+        </a:xfrm>
+      </p:grpSpPr>
+      <p:sp>
+        <p:nvSpPr>
+          <p:cNvPr id="2" name="Espace réservé de l'en-tête 1"/>
+          <p:cNvSpPr>
+            <a:spLocks noGrp="1"/>
+          </p:cNvSpPr>
+          <p:nvPr>
+            <p:ph type="hdr" sz="quarter"/>
+          </p:nvPr>
+        </p:nvSpPr>
+        <p:spPr>
+          <a:xfrm>
+            <a:off x="0" y="0"/>
+            <a:ext cx="2971800" cy="458788"/>
+          </a:xfrm>
+          <a:prstGeom prst="rect">
+            <a:avLst/>
+          </a:prstGeom>
+        </p:spPr>
+        <p:txBody>
+          <a:bodyPr vert="horz" lIns="91440" tIns="45720" rIns="91440" bIns="45720" rtlCol="0"/>
+          <a:lstStyle>
+            <a:lvl1pPr algn="l">
+              <a:defRPr sz="1200"/>
+            </a:lvl1pPr>
+          </a:lstStyle>
+          <a:p>
+            <a:endParaRPr lang="fr-FR"/>
+          </a:p>
+        </p:txBody>
+      </p:sp>
+      <p:sp>
+        <p:nvSpPr>
+          <p:cNvPr id="3" name="Espace réservé de la date 2"/>
+          <p:cNvSpPr>
+            <a:spLocks noGrp="1"/>
+          </p:cNvSpPr>
+          <p:nvPr>
+            <p:ph type="dt" idx="1"/>
+          </p:nvPr>
+        </p:nvSpPr>
+        <p:spPr>
+          <a:xfrm>
+            <a:off x="3884613" y="0"/>
+            <a:ext cx="2971800" cy="458788"/>
+          </a:xfrm>
+          <a:prstGeom prst="rect">
+            <a:avLst/>
+          </a:prstGeom>
+        </p:spPr>
+        <p:txBody>
+          <a:bodyPr vert="horz" lIns="91440" tIns="45720" rIns="91440" bIns="45720" rtlCol="0"/>
+          <a:lstStyle>
+            <a:lvl1pPr algn="r">
+              <a:defRPr sz="1200"/>
+            </a:lvl1pPr>
+          </a:lstStyle>
+          <a:p>
+            <a:fld id="{0F575524-6B77-8C45-96C9-6A0C1860C1B9}" type="datetimeFigureOut">
+              <a:rPr lang="fr-FR" smtClean="0"/>
+              <a:t>22/11/2024</a:t>
+            </a:fld>
+            <a:endParaRPr lang="fr-FR"/>
+          </a:p>
+        </p:txBody>
+      </p:sp>
+      <p:sp>
+        <p:nvSpPr>
+          <p:cNvPr id="4" name="Espace réservé de l'image des diapositives 3"/>
+          <p:cNvSpPr>
+            <a:spLocks noGrp="1" noRot="1" noChangeAspect="1"/>
+          </p:cNvSpPr>
+          <p:nvPr>
+            <p:ph type="sldImg" idx="2"/>
+          </p:nvPr>
+        </p:nvSpPr>
+        <p:spPr>
+          <a:xfrm>
+            <a:off x="685800" y="1143000"/>
+            <a:ext cx="5486400" cy="3086100"/>
+          </a:xfrm>
+          <a:prstGeom prst="rect">
+            <a:avLst/>
+          </a:prstGeom>
+          <a:noFill/>
+          <a:ln w="12700">
+            <a:solidFill>
+              <a:prstClr val="black"/>
+            </a:solidFill>
+          </a:ln>
+        </p:spPr>
+        <p:txBody>
+          <a:bodyPr vert="horz" lIns="91440" tIns="45720" rIns="91440" bIns="45720" rtlCol="0" anchor="ctr"/>
+          <a:lstStyle/>
+          <a:p>
+            <a:endParaRPr lang="fr-FR"/>
+          </a:p>
+        </p:txBody>
+      </p:sp>
+      <p:sp>
+        <p:nvSpPr>
+          <p:cNvPr id="5" name="Espace réservé des notes 4"/>
+          <p:cNvSpPr>
+            <a:spLocks noGrp="1"/>
+          </p:cNvSpPr>
+          <p:nvPr>
+            <p:ph type="body" sz="quarter" idx="3"/>
+          </p:nvPr>
+        </p:nvSpPr>
+        <p:spPr>
+          <a:xfrm>
+            <a:off x="685800" y="4400550"/>
+            <a:ext cx="5486400" cy="3600450"/>
+          </a:xfrm>
+          <a:prstGeom prst="rect">
+            <a:avLst/>
+          </a:prstGeom>
+        </p:spPr>
+        <p:txBody>
+          <a:bodyPr vert="horz" lIns="91440" tIns="45720" rIns="91440" bIns="45720" rtlCol="0"/>
+          <a:lstStyle/>
+          <a:p>
+            <a:pPr lvl="0"/>
+            <a:r>
+              <a:rPr lang="fr-FR"/>
+              <a:t>Cliquez pour modifier les styles du texte du masque</a:t>
+            </a:r>
+          </a:p>
+          <a:p>
+            <a:pPr lvl="1"/>
+            <a:r>
+              <a:rPr lang="fr-FR"/>
+              <a:t>Deuxième niveau</a:t>
+            </a:r>
+          </a:p>
+          <a:p>
+            <a:pPr lvl="2"/>
+            <a:r>
+              <a:rPr lang="fr-FR"/>
+              <a:t>Troisième niveau</a:t>
+            </a:r>
+          </a:p>
+          <a:p>
+            <a:pPr lvl="3"/>
+            <a:r>
+              <a:rPr lang="fr-FR"/>
+              <a:t>Quatrième niveau</a:t>
+            </a:r>
+          </a:p>
+          <a:p>
+            <a:pPr lvl="4"/>
+            <a:r>
+              <a:rPr lang="fr-FR"/>
+              <a:t>Cinquième niveau</a:t>
+            </a:r>
+          </a:p>
+        </p:txBody>
+      </p:sp>
+      <p:sp>
+        <p:nvSpPr>
+          <p:cNvPr id="6" name="Espace réservé du pied de page 5"/>
+          <p:cNvSpPr>
+            <a:spLocks noGrp="1"/>
+          </p:cNvSpPr>
+          <p:nvPr>
+            <p:ph type="ftr" sz="quarter" idx="4"/>
+          </p:nvPr>
+        </p:nvSpPr>
+        <p:spPr>
+          <a:xfrm>
+            <a:off x="0" y="8685213"/>
+            <a:ext cx="2971800" cy="458787"/>
+          </a:xfrm>
+          <a:prstGeom prst="rect">
+            <a:avLst/>
+          </a:prstGeom>
+        </p:spPr>
+        <p:txBody>
+          <a:bodyPr vert="horz" lIns="91440" tIns="45720" rIns="91440" bIns="45720" rtlCol="0" anchor="b"/>
+          <a:lstStyle>
+            <a:lvl1pPr algn="l">
+              <a:defRPr sz="1200"/>
+            </a:lvl1pPr>
+          </a:lstStyle>
+          <a:p>
+            <a:endParaRPr lang="fr-FR"/>
+          </a:p>
+        </p:txBody>
+      </p:sp>
+      <p:sp>
+        <p:nvSpPr>
+          <p:cNvPr id="7" name="Espace réservé du numéro de diapositive 6"/>
+          <p:cNvSpPr>
+            <a:spLocks noGrp="1"/>
+          </p:cNvSpPr>
+          <p:nvPr>
+            <p:ph type="sldNum" sz="quarter" idx="5"/>
+          </p:nvPr>
+        </p:nvSpPr>
+        <p:spPr>
+          <a:xfrm>
+            <a:off x="3884613" y="8685213"/>
+            <a:ext cx="2971800" cy="458787"/>
+          </a:xfrm>
+          <a:prstGeom prst="rect">
+            <a:avLst/>
+          </a:prstGeom>
+        </p:spPr>
+        <p:txBody>
+          <a:bodyPr vert="horz" lIns="91440" tIns="45720" rIns="91440" bIns="45720" rtlCol="0" anchor="b"/>
+          <a:lstStyle>
+            <a:lvl1pPr algn="r">
+              <a:defRPr sz="1200"/>
+            </a:lvl1pPr>
+          </a:lstStyle>
+          <a:p>
+            <a:fld id="{AE5B8080-3B04-F341-8EDC-5C3379794A19}" type="slidenum">
+              <a:rPr lang="fr-FR" smtClean="0"/>
+              <a:t>‹N°›</a:t>
+            </a:fld>
+            <a:endParaRPr lang="fr-FR"/>
+          </a:p>
+        </p:txBody>
+      </p:sp>
+    </p:spTree>
+    <p:extLst>
+      <p:ext uri="{BB962C8B-B14F-4D97-AF65-F5344CB8AC3E}">
+        <p14:creationId xmlns:p14="http://schemas.microsoft.com/office/powerpoint/2010/main" val="2170240089"/>
+      </p:ext>
+    </p:extLst>
+  </p:cSld>
+  <p:clrMap bg1="lt1" tx1="dk1" bg2="lt2" tx2="dk2" accent1="accent1" accent2="accent2" accent3="accent3" accent4="accent4" accent5="accent5" accent6="accent6" hlink="hlink" folHlink="folHlink"/>
+  <p:notesStyle>
+    <a:lvl1pPr marL="0" algn="l" defTabSz="914400" rtl="0" eaLnBrk="1" latinLnBrk="0" hangingPunct="1">
+      <a:defRPr sz="1200" kern="1200">
+        <a:solidFill>
+          <a:schemeClr val="tx1"/>
+        </a:solidFill>
+        <a:latin typeface="+mn-lt"/>
+        <a:ea typeface="+mn-ea"/>
+        <a:cs typeface="+mn-cs"/>
+      </a:defRPr>
+    </a:lvl1pPr>
+    <a:lvl2pPr marL="457200" algn="l" defTabSz="914400" rtl="0" eaLnBrk="1" latinLnBrk="0" hangingPunct="1">
+      <a:defRPr sz="1200" kern="1200">
+        <a:solidFill>
+          <a:schemeClr val="tx1"/>
+        </a:solidFill>
+        <a:latin typeface="+mn-lt"/>
+        <a:ea typeface="+mn-ea"/>
+        <a:cs typeface="+mn-cs"/>
+      </a:defRPr>
+    </a:lvl2pPr>
+    <a:lvl3pPr marL="914400" algn="l" defTabSz="914400" rtl="0" eaLnBrk="1" latinLnBrk="0" hangingPunct="1">
+      <a:defRPr sz="1200" kern="1200">
+        <a:solidFill>
+          <a:schemeClr val="tx1"/>
+        </a:solidFill>
+        <a:latin typeface="+mn-lt"/>
+        <a:ea typeface="+mn-ea"/>
+        <a:cs typeface="+mn-cs"/>
+      </a:defRPr>
+    </a:lvl3pPr>
+    <a:lvl4pPr marL="1371600" algn="l" defTabSz="914400" rtl="0" eaLnBrk="1" latinLnBrk="0" hangingPunct="1">
+      <a:defRPr sz="1200" kern="1200">
+        <a:solidFill>
+          <a:schemeClr val="tx1"/>
+        </a:solidFill>
+        <a:latin typeface="+mn-lt"/>
+        <a:ea typeface="+mn-ea"/>
+        <a:cs typeface="+mn-cs"/>
+      </a:defRPr>
+    </a:lvl4pPr>
+    <a:lvl5pPr marL="1828800" algn="l" defTabSz="914400" rtl="0" eaLnBrk="1" latinLnBrk="0" hangingPunct="1">
+      <a:defRPr sz="1200" kern="1200">
+        <a:solidFill>
+          <a:schemeClr val="tx1"/>
+        </a:solidFill>
+        <a:latin typeface="+mn-lt"/>
+        <a:ea typeface="+mn-ea"/>
+        <a:cs typeface="+mn-cs"/>
+      </a:defRPr>
+    </a:lvl5pPr>
+    <a:lvl6pPr marL="2286000" algn="l" defTabSz="914400" rtl="0" eaLnBrk="1" latinLnBrk="0" hangingPunct="1">
+      <a:defRPr sz="1200" kern="1200">
+        <a:solidFill>
+          <a:schemeClr val="tx1"/>
+        </a:solidFill>
+        <a:latin typeface="+mn-lt"/>
+        <a:ea typeface="+mn-ea"/>
+        <a:cs typeface="+mn-cs"/>
+      </a:defRPr>
+    </a:lvl6pPr>
+    <a:lvl7pPr marL="2743200" algn="l" defTabSz="914400" rtl="0" eaLnBrk="1" latinLnBrk="0" hangingPunct="1">
+      <a:defRPr sz="1200" kern="1200">
+        <a:solidFill>
+          <a:schemeClr val="tx1"/>
+        </a:solidFill>
+        <a:latin typeface="+mn-lt"/>
+        <a:ea typeface="+mn-ea"/>
+        <a:cs typeface="+mn-cs"/>
+      </a:defRPr>
+    </a:lvl7pPr>
+    <a:lvl8pPr marL="3200400" algn="l" defTabSz="914400" rtl="0" eaLnBrk="1" latinLnBrk="0" hangingPunct="1">
+      <a:defRPr sz="1200" kern="1200">
+        <a:solidFill>
+          <a:schemeClr val="tx1"/>
+        </a:solidFill>
+        <a:latin typeface="+mn-lt"/>
+        <a:ea typeface="+mn-ea"/>
+        <a:cs typeface="+mn-cs"/>
+      </a:defRPr>
+    </a:lvl8pPr>
+    <a:lvl9pPr marL="3657600" algn="l" defTabSz="914400" rtl="0" eaLnBrk="1" latinLnBrk="0" hangingPunct="1">
+      <a:defRPr sz="1200" kern="1200">
+        <a:solidFill>
+          <a:schemeClr val="tx1"/>
+        </a:solidFill>
+        <a:latin typeface="+mn-lt"/>
+        <a:ea typeface="+mn-ea"/>
+        <a:cs typeface="+mn-cs"/>
+      </a:defRPr>
+    </a:lvl9pPr>
+  </p:notesStyle>
+</p:notesMaster>
+</file>
+
+<file path=ppt/notesSlides/notesSlide1.xml><?xml version="1.0" encoding="utf-8"?>
+<p:notes xmlns:a="http://schemas.openxmlformats.org/drawingml/2006/main" xmlns:r="http://schemas.openxmlformats.org/officeDocument/2006/relationships" xmlns:p="http://schemas.openxmlformats.org/presentationml/2006/main">
+  <p:cSld>
+    <p:spTree>
+      <p:nvGrpSpPr>
+        <p:cNvPr id="1" name=""/>
+        <p:cNvGrpSpPr/>
+        <p:nvPr/>
+      </p:nvGrpSpPr>
+      <p:grpSpPr>
+        <a:xfrm>
+          <a:off x="0" y="0"/>
+          <a:ext cx="0" cy="0"/>
+          <a:chOff x="0" y="0"/>
+          <a:chExt cx="0" cy="0"/>
+        </a:xfrm>
+      </p:grpSpPr>
+      <p:sp>
+        <p:nvSpPr>
+          <p:cNvPr id="2" name="Espace réservé de l'image des diapositives 1"/>
+          <p:cNvSpPr>
+            <a:spLocks noGrp="1" noRot="1" noChangeAspect="1"/>
+          </p:cNvSpPr>
+          <p:nvPr>
+            <p:ph type="sldImg"/>
+          </p:nvPr>
+        </p:nvSpPr>
+        <p:spPr/>
+      </p:sp>
+      <p:sp>
+        <p:nvSpPr>
+          <p:cNvPr id="3" name="Espace réservé des notes 2"/>
+          <p:cNvSpPr>
+            <a:spLocks noGrp="1"/>
+          </p:cNvSpPr>
+          <p:nvPr>
+            <p:ph type="body" idx="1"/>
+          </p:nvPr>
+        </p:nvSpPr>
+        <p:spPr/>
+        <p:txBody>
+          <a:bodyPr/>
+          <a:lstStyle/>
+          <a:p>
+            <a:endParaRPr lang="fr-FR"/>
+          </a:p>
+        </p:txBody>
+      </p:sp>
+      <p:sp>
+        <p:nvSpPr>
+          <p:cNvPr id="4" name="Espace réservé du numéro de diapositive 3"/>
+          <p:cNvSpPr>
+            <a:spLocks noGrp="1"/>
+          </p:cNvSpPr>
+          <p:nvPr>
+            <p:ph type="sldNum" sz="quarter" idx="5"/>
+          </p:nvPr>
+        </p:nvSpPr>
+        <p:spPr/>
+        <p:txBody>
+          <a:bodyPr/>
+          <a:lstStyle/>
+          <a:p>
+            <a:fld id="{AE5B8080-3B04-F341-8EDC-5C3379794A19}" type="slidenum">
+              <a:rPr lang="fr-FR" smtClean="0"/>
+              <a:t>6</a:t>
+            </a:fld>
+            <a:endParaRPr lang="fr-FR"/>
+          </a:p>
+        </p:txBody>
+      </p:sp>
+    </p:spTree>
+    <p:extLst>
+      <p:ext uri="{BB962C8B-B14F-4D97-AF65-F5344CB8AC3E}">
+        <p14:creationId xmlns:p14="http://schemas.microsoft.com/office/powerpoint/2010/main" val="1210462619"/>
+      </p:ext>
+    </p:extLst>
+  </p:cSld>
+  <p:clrMapOvr>
+    <a:masterClrMapping/>
+  </p:clrMapOvr>
+</p:notes>
 </file>
 
 <file path=ppt/slideLayouts/slideLayout1.xml><?xml version="1.0" encoding="utf-8"?>
@@ -3352,7 +3788,17 @@
           <a:bodyPr/>
           <a:lstStyle/>
           <a:p>
-            <a:endParaRPr lang="fr-FR"/>
+            <a:r>
+              <a:rPr lang="fr-FR" dirty="0"/>
+              <a:t>Data Visualisation:</a:t>
+            </a:r>
+            <a:br>
+              <a:rPr lang="fr-FR" dirty="0"/>
+            </a:br>
+            <a:r>
+              <a:rPr lang="fr-FR" dirty="0"/>
+              <a:t>Réussite du Brevet en France</a:t>
+            </a:r>
           </a:p>
         </p:txBody>
       </p:sp>
@@ -3435,7 +3881,46 @@
           <a:bodyPr/>
           <a:lstStyle/>
           <a:p>
-            <a:endParaRPr lang="fr-FR"/>
+            <a:r>
+              <a:rPr lang="fr-FR" dirty="0"/>
+              <a:t>Données disponibles sur </a:t>
+            </a:r>
+            <a:r>
+              <a:rPr lang="fr-FR" dirty="0" err="1"/>
+              <a:t>data.gouv.fr</a:t>
+            </a:r>
+            <a:endParaRPr lang="fr-FR" dirty="0"/>
+          </a:p>
+          <a:p>
+            <a:endParaRPr lang="fr-FR" dirty="0"/>
+          </a:p>
+          <a:p>
+            <a:r>
+              <a:rPr lang="fr-FR" dirty="0"/>
+              <a:t>Tous les ans, les données sur le brevet de tous les établissements publics sont partagées </a:t>
+            </a:r>
+          </a:p>
+          <a:p>
+            <a:endParaRPr lang="fr-FR" dirty="0"/>
+          </a:p>
+          <a:p>
+            <a:r>
+              <a:rPr lang="fr-FR" dirty="0"/>
+              <a:t>Permet </a:t>
+            </a:r>
+            <a:r>
+              <a:rPr lang="fr-FR"/>
+              <a:t>un suivi </a:t>
+            </a:r>
+            <a:r>
+              <a:rPr lang="fr-FR" dirty="0"/>
+              <a:t>du niveau </a:t>
+            </a:r>
+            <a:r>
+              <a:rPr lang="fr-FR"/>
+              <a:t>des élèves</a:t>
+            </a:r>
+            <a:endParaRPr lang="fr-FR" dirty="0"/>
           </a:p>
         </p:txBody>
       </p:sp>
@@ -3697,32 +4182,55 @@
           <a:chExt cx="0" cy="0"/>
         </a:xfrm>
       </p:grpSpPr>
+      <p:sp>
+        <p:nvSpPr>
+          <p:cNvPr id="10" name="Espace réservé du contenu 9">
+            <a:extLst>
+              <a:ext uri="{FF2B5EF4-FFF2-40B4-BE49-F238E27FC236}">
+                <a16:creationId xmlns:a16="http://schemas.microsoft.com/office/drawing/2014/main" id="{94F95A54-1484-79E0-68D7-74BA4AFD8FFF}"/>
+              </a:ext>
+            </a:extLst>
+          </p:cNvPr>
+          <p:cNvSpPr>
+            <a:spLocks noGrp="1"/>
+          </p:cNvSpPr>
+          <p:nvPr>
+            <p:ph idx="1"/>
+          </p:nvPr>
+        </p:nvSpPr>
+        <p:spPr/>
+        <p:txBody>
+          <a:bodyPr/>
+          <a:lstStyle/>
+          <a:p>
+            <a:endParaRPr lang="fr-FR"/>
+          </a:p>
+        </p:txBody>
+      </p:sp>
       <p:pic>
         <p:nvPicPr>
-          <p:cNvPr id="4" name="Espace réservé du contenu 3">
-            <a:extLst>
-              <a:ext uri="{FF2B5EF4-FFF2-40B4-BE49-F238E27FC236}">
-                <a16:creationId xmlns:a16="http://schemas.microsoft.com/office/drawing/2014/main" id="{E3AE605F-AB33-EFCE-32B2-A36C6FBB17EC}"/>
+          <p:cNvPr id="11" name="Image 10">
+            <a:extLst>
+              <a:ext uri="{FF2B5EF4-FFF2-40B4-BE49-F238E27FC236}">
+                <a16:creationId xmlns:a16="http://schemas.microsoft.com/office/drawing/2014/main" id="{E95ABC50-B16D-B5E5-6F2A-46EB67772727}"/>
               </a:ext>
             </a:extLst>
           </p:cNvPr>
           <p:cNvPicPr>
-            <a:picLocks noGrp="1" noChangeAspect="1"/>
+            <a:picLocks noChangeAspect="1"/>
           </p:cNvPicPr>
-          <p:nvPr>
-            <p:ph idx="1"/>
-          </p:nvPr>
+          <p:nvPr/>
         </p:nvPicPr>
         <p:blipFill>
-          <a:blip r:embed="rId2"/>
+          <a:blip r:embed="rId3"/>
           <a:stretch>
             <a:fillRect/>
           </a:stretch>
         </p:blipFill>
         <p:spPr>
           <a:xfrm>
-            <a:off x="2262554" y="438912"/>
-            <a:ext cx="7752862" cy="6047232"/>
+            <a:off x="170687" y="116931"/>
+            <a:ext cx="12151331" cy="6624137"/>
           </a:xfrm>
           <a:prstGeom prst="rect">
             <a:avLst/>
@@ -4055,4 +4563,319 @@
     </a:ext>
   </a:extLst>
 </a:theme>
+</file>
+
+<file path=ppt/theme/theme2.xml><?xml version="1.0" encoding="utf-8"?>
+<a:theme xmlns:a="http://schemas.openxmlformats.org/drawingml/2006/main" name="Thème Office">
+  <a:themeElements>
+    <a:clrScheme name="Office">
+      <a:dk1>
+        <a:sysClr val="windowText" lastClr="000000"/>
+      </a:dk1>
+      <a:lt1>
+        <a:sysClr val="window" lastClr="FFFFFF"/>
+      </a:lt1>
+      <a:dk2>
+        <a:srgbClr val="0E2841"/>
+      </a:dk2>
+      <a:lt2>
+        <a:srgbClr val="E8E8E8"/>
+      </a:lt2>
+      <a:accent1>
+        <a:srgbClr val="156082"/>
+      </a:accent1>
+      <a:accent2>
+        <a:srgbClr val="E97132"/>
+      </a:accent2>
+      <a:accent3>
+        <a:srgbClr val="196B24"/>
+      </a:accent3>
+      <a:accent4>
+        <a:srgbClr val="0F9ED5"/>
+      </a:accent4>
+      <a:accent5>
+        <a:srgbClr val="A02B93"/>
+      </a:accent5>
+      <a:accent6>
+        <a:srgbClr val="4EA72E"/>
+      </a:accent6>
+      <a:hlink>
+        <a:srgbClr val="467886"/>
+      </a:hlink>
+      <a:folHlink>
+        <a:srgbClr val="96607D"/>
+      </a:folHlink>
+    </a:clrScheme>
+    <a:fontScheme name="Office">
+      <a:majorFont>
+        <a:latin typeface="Aptos Display" panose="02110004020202020204"/>
+        <a:ea typeface=""/>
+        <a:cs typeface=""/>
+        <a:font script="Jpan" typeface="游ゴシック Light"/>
+        <a:font script="Hang" typeface="맑은 고딕"/>
+        <a:font script="Hans" typeface="等线 Light"/>
+        <a:font script="Hant" typeface="新細明體"/>
+        <a:font script="Arab" typeface="Times New Roman"/>
+        <a:font script="Hebr" typeface="Times New Roman"/>
+        <a:font script="Thai" typeface="Angsana New"/>
+        <a:font script="Ethi" typeface="Nyala"/>
+        <a:font script="Beng" typeface="Vrinda"/>
+        <a:font script="Gujr" typeface="Shruti"/>
+        <a:font script="Khmr" typeface="MoolBoran"/>
+        <a:font script="Knda" typeface="Tunga"/>
+        <a:font script="Guru" typeface="Raavi"/>
+        <a:font script="Cans" typeface="Euphemia"/>
+        <a:font script="Cher" typeface="Plantagenet Cherokee"/>
+        <a:font script="Yiii" typeface="Microsoft Yi Baiti"/>
+        <a:font script="Tibt" typeface="Microsoft Himalaya"/>
+        <a:font script="Thaa" typeface="MV Boli"/>
+        <a:font script="Deva" typeface="Mangal"/>
+        <a:font script="Telu" typeface="Gautami"/>
+        <a:font script="Taml" typeface="Latha"/>
+        <a:font script="Syrc" typeface="Estrangelo Edessa"/>
+        <a:font script="Orya" typeface="Kalinga"/>
+        <a:font script="Mlym" typeface="Kartika"/>
+        <a:font script="Laoo" typeface="DokChampa"/>
+        <a:font script="Sinh" typeface="Iskoola Pota"/>
+        <a:font script="Mong" typeface="Mongolian Baiti"/>
+        <a:font script="Viet" typeface="Times New Roman"/>
+        <a:font script="Uigh" typeface="Microsoft Uighur"/>
+        <a:font script="Geor" typeface="Sylfaen"/>
+        <a:font script="Armn" typeface="Arial"/>
+        <a:font script="Bugi" typeface="Leelawadee UI"/>
+        <a:font script="Bopo" typeface="Microsoft JhengHei"/>
+        <a:font script="Java" typeface="Javanese Text"/>
+        <a:font script="Lisu" typeface="Segoe UI"/>
+        <a:font script="Mymr" typeface="Myanmar Text"/>
+        <a:font script="Nkoo" typeface="Ebrima"/>
+        <a:font script="Olck" typeface="Nirmala UI"/>
+        <a:font script="Osma" typeface="Ebrima"/>
+        <a:font script="Phag" typeface="Phagspa"/>
+        <a:font script="Syrn" typeface="Estrangelo Edessa"/>
+        <a:font script="Syrj" typeface="Estrangelo Edessa"/>
+        <a:font script="Syre" typeface="Estrangelo Edessa"/>
+        <a:font script="Sora" typeface="Nirmala UI"/>
+        <a:font script="Tale" typeface="Microsoft Tai Le"/>
+        <a:font script="Talu" typeface="Microsoft New Tai Lue"/>
+        <a:font script="Tfng" typeface="Ebrima"/>
+      </a:majorFont>
+      <a:minorFont>
+        <a:latin typeface="Aptos" panose="02110004020202020204"/>
+        <a:ea typeface=""/>
+        <a:cs typeface=""/>
+        <a:font script="Jpan" typeface="游ゴシック"/>
+        <a:font script="Hang" typeface="맑은 고딕"/>
+        <a:font script="Hans" typeface="等线"/>
+        <a:font script="Hant" typeface="新細明體"/>
+        <a:font script="Arab" typeface="Arial"/>
+        <a:font script="Hebr" typeface="Arial"/>
+        <a:font script="Thai" typeface="Cordia New"/>
+        <a:font script="Ethi" typeface="Nyala"/>
+        <a:font script="Beng" typeface="Vrinda"/>
+        <a:font script="Gujr" typeface="Shruti"/>
+        <a:font script="Khmr" typeface="DaunPenh"/>
+        <a:font script="Knda" typeface="Tunga"/>
+        <a:font script="Guru" typeface="Raavi"/>
+        <a:font script="Cans" typeface="Euphemia"/>
+        <a:font script="Cher" typeface="Plantagenet Cherokee"/>
+        <a:font script="Yiii" typeface="Microsoft Yi Baiti"/>
+        <a:font script="Tibt" typeface="Microsoft Himalaya"/>
+        <a:font script="Thaa" typeface="MV Boli"/>
+        <a:font script="Deva" typeface="Mangal"/>
+        <a:font script="Telu" typeface="Gautami"/>
+        <a:font script="Taml" typeface="Latha"/>
+        <a:font script="Syrc" typeface="Estrangelo Edessa"/>
+        <a:font script="Orya" typeface="Kalinga"/>
+        <a:font script="Mlym" typeface="Kartika"/>
+        <a:font script="Laoo" typeface="DokChampa"/>
+        <a:font script="Sinh" typeface="Iskoola Pota"/>
+        <a:font script="Mong" typeface="Mongolian Baiti"/>
+        <a:font script="Viet" typeface="Arial"/>
+        <a:font script="Uigh" typeface="Microsoft Uighur"/>
+        <a:font script="Geor" typeface="Sylfaen"/>
+        <a:font script="Armn" typeface="Arial"/>
+        <a:font script="Bugi" typeface="Leelawadee UI"/>
+        <a:font script="Bopo" typeface="Microsoft JhengHei"/>
+        <a:font script="Java" typeface="Javanese Text"/>
+        <a:font script="Lisu" typeface="Segoe UI"/>
+        <a:font script="Mymr" typeface="Myanmar Text"/>
+        <a:font script="Nkoo" typeface="Ebrima"/>
+        <a:font script="Olck" typeface="Nirmala UI"/>
+        <a:font script="Osma" typeface="Ebrima"/>
+        <a:font script="Phag" typeface="Phagspa"/>
+        <a:font script="Syrn" typeface="Estrangelo Edessa"/>
+        <a:font script="Syrj" typeface="Estrangelo Edessa"/>
+        <a:font script="Syre" typeface="Estrangelo Edessa"/>
+        <a:font script="Sora" typeface="Nirmala UI"/>
+        <a:font script="Tale" typeface="Microsoft Tai Le"/>
+        <a:font script="Talu" typeface="Microsoft New Tai Lue"/>
+        <a:font script="Tfng" typeface="Ebrima"/>
+      </a:minorFont>
+    </a:fontScheme>
+    <a:fmtScheme name="Office">
+      <a:fillStyleLst>
+        <a:solidFill>
+          <a:schemeClr val="phClr"/>
+        </a:solidFill>
+        <a:gradFill rotWithShape="1">
+          <a:gsLst>
+            <a:gs pos="0">
+              <a:schemeClr val="phClr">
+                <a:lumMod val="110000"/>
+                <a:satMod val="105000"/>
+                <a:tint val="67000"/>
+              </a:schemeClr>
+            </a:gs>
+            <a:gs pos="50000">
+              <a:schemeClr val="phClr">
+                <a:lumMod val="105000"/>
+                <a:satMod val="103000"/>
+                <a:tint val="73000"/>
+              </a:schemeClr>
+            </a:gs>
+            <a:gs pos="100000">
+              <a:schemeClr val="phClr">
+                <a:lumMod val="105000"/>
+                <a:satMod val="109000"/>
+                <a:tint val="81000"/>
+              </a:schemeClr>
+            </a:gs>
+          </a:gsLst>
+          <a:lin ang="5400000" scaled="0"/>
+        </a:gradFill>
+        <a:gradFill rotWithShape="1">
+          <a:gsLst>
+            <a:gs pos="0">
+              <a:schemeClr val="phClr">
+                <a:satMod val="103000"/>
+                <a:lumMod val="102000"/>
+                <a:tint val="94000"/>
+              </a:schemeClr>
+            </a:gs>
+            <a:gs pos="50000">
+              <a:schemeClr val="phClr">
+                <a:satMod val="110000"/>
+                <a:lumMod val="100000"/>
+                <a:shade val="100000"/>
+              </a:schemeClr>
+            </a:gs>
+            <a:gs pos="100000">
+              <a:schemeClr val="phClr">
+                <a:lumMod val="99000"/>
+                <a:satMod val="120000"/>
+                <a:shade val="78000"/>
+              </a:schemeClr>
+            </a:gs>
+          </a:gsLst>
+          <a:lin ang="5400000" scaled="0"/>
+        </a:gradFill>
+      </a:fillStyleLst>
+      <a:lnStyleLst>
+        <a:ln w="12700" cap="flat" cmpd="sng" algn="ctr">
+          <a:solidFill>
+            <a:schemeClr val="phClr"/>
+          </a:solidFill>
+          <a:prstDash val="solid"/>
+          <a:miter lim="800000"/>
+        </a:ln>
+        <a:ln w="19050" cap="flat" cmpd="sng" algn="ctr">
+          <a:solidFill>
+            <a:schemeClr val="phClr"/>
+          </a:solidFill>
+          <a:prstDash val="solid"/>
+          <a:miter lim="800000"/>
+        </a:ln>
+        <a:ln w="25400" cap="flat" cmpd="sng" algn="ctr">
+          <a:solidFill>
+            <a:schemeClr val="phClr"/>
+          </a:solidFill>
+          <a:prstDash val="solid"/>
+          <a:miter lim="800000"/>
+        </a:ln>
+      </a:lnStyleLst>
+      <a:effectStyleLst>
+        <a:effectStyle>
+          <a:effectLst/>
+        </a:effectStyle>
+        <a:effectStyle>
+          <a:effectLst/>
+        </a:effectStyle>
+        <a:effectStyle>
+          <a:effectLst>
+            <a:outerShdw blurRad="57150" dist="19050" dir="5400000" algn="ctr" rotWithShape="0">
+              <a:srgbClr val="000000">
+                <a:alpha val="63000"/>
+              </a:srgbClr>
+            </a:outerShdw>
+          </a:effectLst>
+        </a:effectStyle>
+      </a:effectStyleLst>
+      <a:bgFillStyleLst>
+        <a:solidFill>
+          <a:schemeClr val="phClr"/>
+        </a:solidFill>
+        <a:solidFill>
+          <a:schemeClr val="phClr">
+            <a:tint val="95000"/>
+            <a:satMod val="170000"/>
+          </a:schemeClr>
+        </a:solidFill>
+        <a:gradFill rotWithShape="1">
+          <a:gsLst>
+            <a:gs pos="0">
+              <a:schemeClr val="phClr">
+                <a:tint val="93000"/>
+                <a:satMod val="150000"/>
+                <a:shade val="98000"/>
+                <a:lumMod val="102000"/>
+              </a:schemeClr>
+            </a:gs>
+            <a:gs pos="50000">
+              <a:schemeClr val="phClr">
+                <a:tint val="98000"/>
+                <a:satMod val="130000"/>
+                <a:shade val="90000"/>
+                <a:lumMod val="103000"/>
+              </a:schemeClr>
+            </a:gs>
+            <a:gs pos="100000">
+              <a:schemeClr val="phClr">
+                <a:shade val="63000"/>
+                <a:satMod val="120000"/>
+              </a:schemeClr>
+            </a:gs>
+          </a:gsLst>
+          <a:lin ang="5400000" scaled="0"/>
+        </a:gradFill>
+      </a:bgFillStyleLst>
+    </a:fmtScheme>
+  </a:themeElements>
+  <a:objectDefaults>
+    <a:lnDef>
+      <a:spPr/>
+      <a:bodyPr/>
+      <a:lstStyle/>
+      <a:style>
+        <a:lnRef idx="2">
+          <a:schemeClr val="accent1"/>
+        </a:lnRef>
+        <a:fillRef idx="0">
+          <a:schemeClr val="accent1"/>
+        </a:fillRef>
+        <a:effectRef idx="1">
+          <a:schemeClr val="accent1"/>
+        </a:effectRef>
+        <a:fontRef idx="minor">
+          <a:schemeClr val="tx1"/>
+        </a:fontRef>
+      </a:style>
+    </a:lnDef>
+  </a:objectDefaults>
+  <a:extraClrSchemeLst/>
+  <a:extLst>
+    <a:ext uri="{05A4C25C-085E-4340-85A3-A5531E510DB2}">
+      <thm15:themeFamily xmlns:thm15="http://schemas.microsoft.com/office/thememl/2012/main" name="Office Theme" id="{2E142A2C-CD16-42D6-873A-C26D2A0506FA}" vid="{1BDDFF52-6CD6-40A5-AB3C-68EB2F1E4D0A}"/>
+    </a:ext>
+  </a:extLst>
+</a:theme>
 </file>
</xml_diff>

<commit_message>
finalisation graphique taux x acamdéie x privé/public
</commit_message>
<xml_diff>
--- a/Présentation.pptx
+++ b/Présentation.pptx
@@ -108,6 +108,11 @@
       </a:defRPr>
     </a:lvl9pPr>
   </p:defaultTextStyle>
+  <p:extLst>
+    <p:ext uri="{EFAFB233-063F-42B5-8137-9DF3F51BA10A}">
+      <p15:sldGuideLst xmlns:p15="http://schemas.microsoft.com/office/powerpoint/2012/main"/>
+    </p:ext>
+  </p:extLst>
 </p:presentation>
 </file>
 
@@ -258,7 +263,7 @@
           <a:p>
             <a:fld id="{6059FE6A-2FE6-4909-8879-B2C5789DC49E}" type="datetimeFigureOut">
               <a:rPr lang="fr-FR" smtClean="0"/>
-              <a:t>21/11/2024</a:t>
+              <a:t>22/11/2024</a:t>
             </a:fld>
             <a:endParaRPr lang="fr-FR"/>
           </a:p>
@@ -456,7 +461,7 @@
           <a:p>
             <a:fld id="{6059FE6A-2FE6-4909-8879-B2C5789DC49E}" type="datetimeFigureOut">
               <a:rPr lang="fr-FR" smtClean="0"/>
-              <a:t>21/11/2024</a:t>
+              <a:t>22/11/2024</a:t>
             </a:fld>
             <a:endParaRPr lang="fr-FR"/>
           </a:p>
@@ -664,7 +669,7 @@
           <a:p>
             <a:fld id="{6059FE6A-2FE6-4909-8879-B2C5789DC49E}" type="datetimeFigureOut">
               <a:rPr lang="fr-FR" smtClean="0"/>
-              <a:t>21/11/2024</a:t>
+              <a:t>22/11/2024</a:t>
             </a:fld>
             <a:endParaRPr lang="fr-FR"/>
           </a:p>
@@ -862,7 +867,7 @@
           <a:p>
             <a:fld id="{6059FE6A-2FE6-4909-8879-B2C5789DC49E}" type="datetimeFigureOut">
               <a:rPr lang="fr-FR" smtClean="0"/>
-              <a:t>21/11/2024</a:t>
+              <a:t>22/11/2024</a:t>
             </a:fld>
             <a:endParaRPr lang="fr-FR"/>
           </a:p>
@@ -1137,7 +1142,7 @@
           <a:p>
             <a:fld id="{6059FE6A-2FE6-4909-8879-B2C5789DC49E}" type="datetimeFigureOut">
               <a:rPr lang="fr-FR" smtClean="0"/>
-              <a:t>21/11/2024</a:t>
+              <a:t>22/11/2024</a:t>
             </a:fld>
             <a:endParaRPr lang="fr-FR"/>
           </a:p>
@@ -1402,7 +1407,7 @@
           <a:p>
             <a:fld id="{6059FE6A-2FE6-4909-8879-B2C5789DC49E}" type="datetimeFigureOut">
               <a:rPr lang="fr-FR" smtClean="0"/>
-              <a:t>21/11/2024</a:t>
+              <a:t>22/11/2024</a:t>
             </a:fld>
             <a:endParaRPr lang="fr-FR"/>
           </a:p>
@@ -1814,7 +1819,7 @@
           <a:p>
             <a:fld id="{6059FE6A-2FE6-4909-8879-B2C5789DC49E}" type="datetimeFigureOut">
               <a:rPr lang="fr-FR" smtClean="0"/>
-              <a:t>21/11/2024</a:t>
+              <a:t>22/11/2024</a:t>
             </a:fld>
             <a:endParaRPr lang="fr-FR"/>
           </a:p>
@@ -1955,7 +1960,7 @@
           <a:p>
             <a:fld id="{6059FE6A-2FE6-4909-8879-B2C5789DC49E}" type="datetimeFigureOut">
               <a:rPr lang="fr-FR" smtClean="0"/>
-              <a:t>21/11/2024</a:t>
+              <a:t>22/11/2024</a:t>
             </a:fld>
             <a:endParaRPr lang="fr-FR"/>
           </a:p>
@@ -2068,7 +2073,7 @@
           <a:p>
             <a:fld id="{6059FE6A-2FE6-4909-8879-B2C5789DC49E}" type="datetimeFigureOut">
               <a:rPr lang="fr-FR" smtClean="0"/>
-              <a:t>21/11/2024</a:t>
+              <a:t>22/11/2024</a:t>
             </a:fld>
             <a:endParaRPr lang="fr-FR"/>
           </a:p>
@@ -2379,7 +2384,7 @@
           <a:p>
             <a:fld id="{6059FE6A-2FE6-4909-8879-B2C5789DC49E}" type="datetimeFigureOut">
               <a:rPr lang="fr-FR" smtClean="0"/>
-              <a:t>21/11/2024</a:t>
+              <a:t>22/11/2024</a:t>
             </a:fld>
             <a:endParaRPr lang="fr-FR"/>
           </a:p>
@@ -2667,7 +2672,7 @@
           <a:p>
             <a:fld id="{6059FE6A-2FE6-4909-8879-B2C5789DC49E}" type="datetimeFigureOut">
               <a:rPr lang="fr-FR" smtClean="0"/>
-              <a:t>21/11/2024</a:t>
+              <a:t>22/11/2024</a:t>
             </a:fld>
             <a:endParaRPr lang="fr-FR"/>
           </a:p>
@@ -2908,7 +2913,7 @@
           <a:p>
             <a:fld id="{6059FE6A-2FE6-4909-8879-B2C5789DC49E}" type="datetimeFigureOut">
               <a:rPr lang="fr-FR" smtClean="0"/>
-              <a:t>21/11/2024</a:t>
+              <a:t>22/11/2024</a:t>
             </a:fld>
             <a:endParaRPr lang="fr-FR"/>
           </a:p>
@@ -3545,10 +3550,10 @@
       </p:sp>
       <p:pic>
         <p:nvPicPr>
-          <p:cNvPr id="9" name="Image 8">
-            <a:extLst>
-              <a:ext uri="{FF2B5EF4-FFF2-40B4-BE49-F238E27FC236}">
-                <a16:creationId xmlns:a16="http://schemas.microsoft.com/office/drawing/2014/main" id="{8A4CD8BC-06BC-899B-9A70-EF00B2CF11F9}"/>
+          <p:cNvPr id="5" name="Image 4">
+            <a:extLst>
+              <a:ext uri="{FF2B5EF4-FFF2-40B4-BE49-F238E27FC236}">
+                <a16:creationId xmlns:a16="http://schemas.microsoft.com/office/drawing/2014/main" id="{531F8625-CF90-4B1D-511A-7AF7FB2A19F8}"/>
               </a:ext>
             </a:extLst>
           </p:cNvPr>
@@ -3565,8 +3570,8 @@
         </p:blipFill>
         <p:spPr>
           <a:xfrm>
-            <a:off x="0" y="307206"/>
-            <a:ext cx="12192000" cy="6243587"/>
+            <a:off x="0" y="318665"/>
+            <a:ext cx="12192000" cy="6220669"/>
           </a:xfrm>
           <a:prstGeom prst="rect">
             <a:avLst/>

</xml_diff>

<commit_message>
ajout de la légende pour graphique taux x académie x public/privé
</commit_message>
<xml_diff>
--- a/Présentation.pptx
+++ b/Présentation.pptx
@@ -1332,7 +1332,7 @@
         </a:prstGeom>
         <a:solidFill>
           <a:schemeClr val="accent2">
-            <a:hueOff val="4295742"/>
+            <a:hueOff val="4295743"/>
             <a:satOff val="-12329"/>
             <a:lumOff val="-19739"/>
             <a:alphaOff val="0"/>
@@ -1411,7 +1411,7 @@
         </a:prstGeom>
         <a:solidFill>
           <a:schemeClr val="accent2">
-            <a:hueOff val="6443612"/>
+            <a:hueOff val="6443614"/>
             <a:satOff val="-18493"/>
             <a:lumOff val="-29609"/>
             <a:alphaOff val="0"/>
@@ -8965,36 +8965,6 @@
           </a:p>
         </p:txBody>
       </p:sp>
-      <p:pic>
-        <p:nvPicPr>
-          <p:cNvPr id="9" name="Image 8">
-            <a:extLst>
-              <a:ext uri="{FF2B5EF4-FFF2-40B4-BE49-F238E27FC236}">
-                <a16:creationId xmlns:a16="http://schemas.microsoft.com/office/drawing/2014/main" id="{8A4CD8BC-06BC-899B-9A70-EF00B2CF11F9}"/>
-              </a:ext>
-            </a:extLst>
-          </p:cNvPr>
-          <p:cNvPicPr>
-            <a:picLocks noChangeAspect="1"/>
-          </p:cNvPicPr>
-          <p:nvPr/>
-        </p:nvPicPr>
-        <p:blipFill>
-          <a:blip r:embed="rId2"/>
-          <a:stretch>
-            <a:fillRect/>
-          </a:stretch>
-        </p:blipFill>
-        <p:spPr>
-          <a:xfrm>
-            <a:off x="0" y="307206"/>
-            <a:ext cx="12192000" cy="6243587"/>
-          </a:xfrm>
-          <a:prstGeom prst="rect">
-            <a:avLst/>
-          </a:prstGeom>
-        </p:spPr>
-      </p:pic>
     </p:spTree>
     <p:extLst>
       <p:ext uri="{BB962C8B-B14F-4D97-AF65-F5344CB8AC3E}">
@@ -9075,6 +9045,36 @@
           </a:p>
         </p:txBody>
       </p:sp>
+      <p:pic>
+        <p:nvPicPr>
+          <p:cNvPr id="5" name="Image 4">
+            <a:extLst>
+              <a:ext uri="{FF2B5EF4-FFF2-40B4-BE49-F238E27FC236}">
+                <a16:creationId xmlns:a16="http://schemas.microsoft.com/office/drawing/2014/main" id="{ACBC871E-1854-9DF0-D78A-B5E195BD24FC}"/>
+              </a:ext>
+            </a:extLst>
+          </p:cNvPr>
+          <p:cNvPicPr>
+            <a:picLocks noChangeAspect="1"/>
+          </p:cNvPicPr>
+          <p:nvPr/>
+        </p:nvPicPr>
+        <p:blipFill>
+          <a:blip r:embed="rId2"/>
+          <a:stretch>
+            <a:fillRect/>
+          </a:stretch>
+        </p:blipFill>
+        <p:spPr>
+          <a:xfrm>
+            <a:off x="0" y="305957"/>
+            <a:ext cx="12192000" cy="6246085"/>
+          </a:xfrm>
+          <a:prstGeom prst="rect">
+            <a:avLst/>
+          </a:prstGeom>
+        </p:spPr>
+      </p:pic>
     </p:spTree>
     <p:extLst>
       <p:ext uri="{BB962C8B-B14F-4D97-AF65-F5344CB8AC3E}">

</xml_diff>

<commit_message>
ajout espacement dans la légende
</commit_message>
<xml_diff>
--- a/Présentation.pptx
+++ b/Présentation.pptx
@@ -9047,10 +9047,10 @@
       </p:sp>
       <p:pic>
         <p:nvPicPr>
-          <p:cNvPr id="5" name="Image 4">
+          <p:cNvPr id="6" name="Image 5">
             <a:extLst>
               <a:ext uri="{FF2B5EF4-FFF2-40B4-BE49-F238E27FC236}">
-                <a16:creationId xmlns:a16="http://schemas.microsoft.com/office/drawing/2014/main" id="{ACBC871E-1854-9DF0-D78A-B5E195BD24FC}"/>
+                <a16:creationId xmlns:a16="http://schemas.microsoft.com/office/drawing/2014/main" id="{DB7DD6AC-1A56-07BE-01C3-1A77A3065929}"/>
               </a:ext>
             </a:extLst>
           </p:cNvPr>
@@ -9067,8 +9067,8 @@
         </p:blipFill>
         <p:spPr>
           <a:xfrm>
-            <a:off x="0" y="305957"/>
-            <a:ext cx="12192000" cy="6246085"/>
+            <a:off x="0" y="317871"/>
+            <a:ext cx="12192000" cy="6222258"/>
           </a:xfrm>
           <a:prstGeom prst="rect">
             <a:avLst/>

</xml_diff>

<commit_message>
vrai dernier graphique perrine
</commit_message>
<xml_diff>
--- a/Présentation.pptx
+++ b/Présentation.pptx
@@ -9022,10 +9022,10 @@
       </p:sp>
       <p:pic>
         <p:nvPicPr>
-          <p:cNvPr id="5" name="Image 4">
+          <p:cNvPr id="6" name="Image 5">
             <a:extLst>
               <a:ext uri="{FF2B5EF4-FFF2-40B4-BE49-F238E27FC236}">
-                <a16:creationId xmlns:a16="http://schemas.microsoft.com/office/drawing/2014/main" id="{E6C0A38D-7604-9C5B-FFF6-E148CFC2560C}"/>
+                <a16:creationId xmlns:a16="http://schemas.microsoft.com/office/drawing/2014/main" id="{0D291B9F-8D7E-6BEF-7A30-D48293C41AC8}"/>
               </a:ext>
             </a:extLst>
           </p:cNvPr>
@@ -9042,8 +9042,8 @@
         </p:blipFill>
         <p:spPr>
           <a:xfrm>
-            <a:off x="0" y="300279"/>
-            <a:ext cx="12192000" cy="6257441"/>
+            <a:off x="0" y="292629"/>
+            <a:ext cx="12192000" cy="6272742"/>
           </a:xfrm>
           <a:prstGeom prst="rect">
             <a:avLst/>

</xml_diff>